<commit_message>
Update 0 Information Meeting.pptx
</commit_message>
<xml_diff>
--- a/web/b23/0 Information Meeting.pptx
+++ b/web/b23/0 Information Meeting.pptx
@@ -1398,7 +1398,7 @@
               </a:pPr>
               <a:t>1</a:t>
             </a:fld>
-            <a:endParaRPr lang="da-DK" altLang="da-DK" sz="1300">
+            <a:endParaRPr lang="da-DK" altLang="da-DK" sz="1300" dirty="0">
               <a:solidFill>
                 <a:srgbClr val="CC0000"/>
               </a:solidFill>
@@ -1555,7 +1555,7 @@
               </a:pPr>
               <a:t>10</a:t>
             </a:fld>
-            <a:endParaRPr lang="da-DK" altLang="da-DK"/>
+            <a:endParaRPr lang="da-DK" altLang="da-DK" dirty="0"/>
           </a:p>
         </p:txBody>
       </p:sp>
@@ -1645,7 +1645,7 @@
               </a:pPr>
               <a:t>11</a:t>
             </a:fld>
-            <a:endParaRPr lang="da-DK" altLang="da-DK"/>
+            <a:endParaRPr lang="da-DK" altLang="da-DK" dirty="0"/>
           </a:p>
         </p:txBody>
       </p:sp>
@@ -2222,7 +2222,7 @@
               </a:pPr>
               <a:t>2</a:t>
             </a:fld>
-            <a:endParaRPr lang="da-DK" altLang="da-DK" sz="1300">
+            <a:endParaRPr lang="da-DK" altLang="da-DK" sz="1300" dirty="0">
               <a:solidFill>
                 <a:srgbClr val="CC0000"/>
               </a:solidFill>
@@ -2286,7 +2286,7 @@
           <a:lstStyle/>
           <a:p>
             <a:pPr eaLnBrk="1" hangingPunct="1"/>
-            <a:endParaRPr lang="en-US" altLang="da-DK" smtClean="0">
+            <a:endParaRPr lang="en-US" altLang="da-DK" dirty="0" smtClean="0">
               <a:latin typeface="Times New Roman" pitchFamily="18" charset="0"/>
               <a:ea typeface="ＭＳ Ｐゴシック" pitchFamily="34" charset="-128"/>
             </a:endParaRPr>
@@ -2350,7 +2350,7 @@
           <a:bodyPr/>
           <a:lstStyle/>
           <a:p>
-            <a:endParaRPr lang="da-DK"/>
+            <a:endParaRPr lang="da-DK" dirty="0"/>
           </a:p>
         </p:txBody>
       </p:sp>
@@ -2379,7 +2379,7 @@
               </a:pPr>
               <a:t>3</a:t>
             </a:fld>
-            <a:endParaRPr lang="da-DK" altLang="da-DK"/>
+            <a:endParaRPr lang="da-DK" altLang="da-DK" dirty="0"/>
           </a:p>
         </p:txBody>
       </p:sp>
@@ -2440,7 +2440,7 @@
           <a:bodyPr/>
           <a:lstStyle/>
           <a:p>
-            <a:endParaRPr lang="da-DK"/>
+            <a:endParaRPr lang="da-DK" dirty="0"/>
           </a:p>
         </p:txBody>
       </p:sp>
@@ -2469,7 +2469,7 @@
               </a:pPr>
               <a:t>4</a:t>
             </a:fld>
-            <a:endParaRPr lang="da-DK" altLang="da-DK"/>
+            <a:endParaRPr lang="da-DK" altLang="da-DK" dirty="0"/>
           </a:p>
         </p:txBody>
       </p:sp>
@@ -2559,7 +2559,7 @@
               </a:pPr>
               <a:t>5</a:t>
             </a:fld>
-            <a:endParaRPr lang="da-DK" altLang="da-DK"/>
+            <a:endParaRPr lang="da-DK" altLang="da-DK" dirty="0"/>
           </a:p>
         </p:txBody>
       </p:sp>
@@ -2649,7 +2649,7 @@
               </a:pPr>
               <a:t>6</a:t>
             </a:fld>
-            <a:endParaRPr lang="da-DK" altLang="da-DK"/>
+            <a:endParaRPr lang="da-DK" altLang="da-DK" dirty="0"/>
           </a:p>
         </p:txBody>
       </p:sp>
@@ -2739,7 +2739,7 @@
               </a:pPr>
               <a:t>7</a:t>
             </a:fld>
-            <a:endParaRPr lang="da-DK" altLang="da-DK"/>
+            <a:endParaRPr lang="da-DK" altLang="da-DK" dirty="0"/>
           </a:p>
         </p:txBody>
       </p:sp>
@@ -2829,7 +2829,7 @@
               </a:pPr>
               <a:t>8</a:t>
             </a:fld>
-            <a:endParaRPr lang="da-DK" altLang="da-DK"/>
+            <a:endParaRPr lang="da-DK" altLang="da-DK" dirty="0"/>
           </a:p>
         </p:txBody>
       </p:sp>
@@ -2919,7 +2919,7 @@
               </a:pPr>
               <a:t>9</a:t>
             </a:fld>
-            <a:endParaRPr lang="da-DK" altLang="da-DK"/>
+            <a:endParaRPr lang="da-DK" altLang="da-DK" dirty="0"/>
           </a:p>
         </p:txBody>
       </p:sp>
@@ -4653,11 +4653,7 @@
             <a:pPr marL="358775"/>
             <a:r>
               <a:rPr lang="en-GB" altLang="da-DK" sz="2800" dirty="0" smtClean="0"/>
-              <a:t>Welcome to the information meeting for bachelor projects in the spring of </a:t>
-            </a:r>
-            <a:r>
-              <a:rPr lang="en-GB" altLang="da-DK" sz="2800" dirty="0" smtClean="0"/>
-              <a:t>2023</a:t>
+              <a:t>Welcome to the information meeting for bachelor projects in the spring of 2023</a:t>
             </a:r>
             <a:endParaRPr lang="en-GB" altLang="da-DK" sz="2800" dirty="0"/>
           </a:p>
@@ -5050,11 +5046,6 @@
               </a:rPr>
               <a:t>Lectures</a:t>
             </a:r>
-            <a:endParaRPr lang="en-US" altLang="da-DK" sz="1600" b="1" spc="-50" dirty="0" smtClean="0">
-              <a:solidFill>
-                <a:srgbClr val="008000"/>
-              </a:solidFill>
-            </a:endParaRPr>
           </a:p>
           <a:p>
             <a:pPr marL="271463" lvl="1" indent="-271463">
@@ -6058,8 +6049,24 @@
               </a:spcBef>
             </a:pPr>
             <a:r>
+              <a:rPr lang="en-GB" altLang="da-DK" sz="1600" dirty="0" smtClean="0"/>
+              <a:t>Posting on “</a:t>
+            </a:r>
+            <a:r>
+              <a:rPr lang="en-GB" altLang="da-DK" sz="1600" noProof="1" smtClean="0"/>
+              <a:t>Vigtige </a:t>
+            </a:r>
+            <a:r>
+              <a:rPr lang="en-GB" altLang="da-DK" sz="1600" noProof="1" smtClean="0"/>
+              <a:t>meddelelser</a:t>
+            </a:r>
+            <a:r>
+              <a:rPr lang="en-GB" altLang="da-DK" sz="1600" dirty="0" smtClean="0"/>
+              <a:t>” (announcements) </a:t>
+            </a:r>
+            <a:r>
               <a:rPr lang="en-GB" altLang="da-DK" sz="1600" dirty="0"/>
-              <a:t>"Announcements" which contain important information </a:t>
+              <a:t>which contain important information </a:t>
             </a:r>
             <a:r>
               <a:rPr lang="en-GB" altLang="da-DK" sz="1600" dirty="0" smtClean="0"/>
@@ -6083,7 +6090,11 @@
             </a:pPr>
             <a:r>
               <a:rPr lang="en-GB" altLang="da-DK" sz="1600" dirty="0" smtClean="0"/>
-              <a:t>The postings on the “Discussion forum”</a:t>
+              <a:t>Postings </a:t>
+            </a:r>
+            <a:r>
+              <a:rPr lang="en-GB" altLang="da-DK" sz="1600" dirty="0" smtClean="0"/>
+              <a:t>on the “Discussion forum”</a:t>
             </a:r>
             <a:endParaRPr lang="en-GB" altLang="da-DK" sz="1600" dirty="0"/>
           </a:p>
@@ -6148,34 +6159,7 @@
                 </a:solidFill>
                 <a:cs typeface="ＭＳ Ｐゴシック" charset="0"/>
               </a:rPr>
-              <a:t>Each research group has a separate </a:t>
-            </a:r>
-            <a:r>
-              <a:rPr lang="en-GB" altLang="da-DK" sz="1800" b="1" smtClean="0">
-                <a:solidFill>
-                  <a:srgbClr val="A50021"/>
-                </a:solidFill>
-                <a:cs typeface="ＭＳ Ｐゴシック" charset="0"/>
-              </a:rPr>
-              <a:t>Brightspace </a:t>
-            </a:r>
-            <a:r>
-              <a:rPr lang="en-GB" altLang="da-DK" sz="1800" b="1" smtClean="0">
-                <a:solidFill>
-                  <a:srgbClr val="A50021"/>
-                </a:solidFill>
-                <a:cs typeface="ＭＳ Ｐゴシック" charset="0"/>
-              </a:rPr>
-              <a:t>subpage </a:t>
-            </a:r>
-            <a:r>
-              <a:rPr lang="en-GB" altLang="da-DK" sz="1800" b="1" dirty="0" smtClean="0">
-                <a:solidFill>
-                  <a:srgbClr val="A50021"/>
-                </a:solidFill>
-                <a:cs typeface="ＭＳ Ｐゴシック" charset="0"/>
-              </a:rPr>
-              <a:t>where </a:t>
+              <a:t>Each research group has a separate Brightspace subpage where </a:t>
             </a:r>
             <a:r>
               <a:rPr lang="en-US" altLang="da-DK" sz="1800" b="1" dirty="0" smtClean="0">
@@ -7147,23 +7131,7 @@
                   <a:srgbClr val="A50021"/>
                 </a:solidFill>
               </a:rPr>
-              <a:t>There will be a total of approximately </a:t>
-            </a:r>
-            <a:r>
-              <a:rPr lang="en-GB" altLang="da-DK" sz="1800" b="1" dirty="0" smtClean="0">
-                <a:solidFill>
-                  <a:srgbClr val="A50021"/>
-                </a:solidFill>
-              </a:rPr>
-              <a:t>150 </a:t>
-            </a:r>
-            <a:r>
-              <a:rPr lang="en-GB" altLang="da-DK" sz="1800" b="1" dirty="0" smtClean="0">
-                <a:solidFill>
-                  <a:srgbClr val="A50021"/>
-                </a:solidFill>
-              </a:rPr>
-              <a:t>students doing their cs / it bachelor project in the Spring of 2022</a:t>
+              <a:t>There will be a total of approximately 150 students doing their cs / it bachelor project in the Spring of 2022</a:t>
             </a:r>
           </a:p>
           <a:p>
@@ -7174,23 +7142,7 @@
             </a:pPr>
             <a:r>
               <a:rPr lang="en-GB" altLang="da-DK" sz="1600" dirty="0" smtClean="0"/>
-              <a:t>Approximately </a:t>
-            </a:r>
-            <a:r>
-              <a:rPr lang="en-GB" altLang="da-DK" sz="1600" dirty="0" smtClean="0"/>
-              <a:t>110 </a:t>
-            </a:r>
-            <a:r>
-              <a:rPr lang="en-GB" altLang="da-DK" sz="1600" dirty="0" smtClean="0"/>
-              <a:t>within cs, and </a:t>
-            </a:r>
-            <a:r>
-              <a:rPr lang="en-GB" altLang="da-DK" sz="1600" dirty="0" smtClean="0"/>
-              <a:t>40 </a:t>
-            </a:r>
-            <a:r>
-              <a:rPr lang="en-GB" altLang="da-DK" sz="1600" dirty="0" smtClean="0"/>
-              <a:t>within it product development</a:t>
+              <a:t>Approximately 110 within cs, and 40 within it product development</a:t>
             </a:r>
           </a:p>
           <a:p>
@@ -7484,20 +7436,12 @@
               <a:t>Rene </a:t>
             </a:r>
             <a:r>
-              <a:rPr lang="en-US" sz="1600" kern="1200" dirty="0" err="1" smtClean="0">
+              <a:rPr lang="en-US" sz="1600" kern="1200" dirty="0" smtClean="0">
                 <a:latin typeface="Arial" pitchFamily="34" charset="0"/>
                 <a:ea typeface="ＭＳ Ｐゴシック" pitchFamily="34" charset="-128"/>
                 <a:cs typeface="+mn-cs"/>
               </a:rPr>
-              <a:t>Schwiegelshohn</a:t>
-            </a:r>
-            <a:r>
-              <a:rPr lang="en-US" sz="1600" kern="1200" dirty="0" smtClean="0">
-                <a:latin typeface="Arial" pitchFamily="34" charset="0"/>
-                <a:ea typeface="ＭＳ Ｐゴシック" pitchFamily="34" charset="-128"/>
-                <a:cs typeface="+mn-cs"/>
-              </a:rPr>
-              <a:t>)</a:t>
+              <a:t>Schwiegelshohn)</a:t>
             </a:r>
             <a:endParaRPr lang="en-US" sz="1600" kern="1200" dirty="0">
               <a:latin typeface="Arial" pitchFamily="34" charset="0"/>
@@ -8913,15 +8857,7 @@
             </a:pPr>
             <a:r>
               <a:rPr lang="en-GB" altLang="da-DK" sz="1800" noProof="0" dirty="0" smtClean="0"/>
-              <a:t>On the Brightspace page of </a:t>
-            </a:r>
-            <a:r>
-              <a:rPr lang="en-GB" altLang="da-DK" sz="1800" noProof="0" dirty="0" smtClean="0"/>
-              <a:t>the bachelor </a:t>
-            </a:r>
-            <a:r>
-              <a:rPr lang="en-GB" altLang="da-DK" sz="1800" noProof="0" dirty="0" smtClean="0"/>
-              <a:t>project course you can find a number of proposals for bachelor projects</a:t>
+              <a:t>On the Brightspace page of the bachelor project course you can find a number of proposals for bachelor projects</a:t>
             </a:r>
           </a:p>
           <a:p>
@@ -10108,15 +10044,7 @@
                   <a:srgbClr val="008000"/>
                 </a:solidFill>
               </a:rPr>
-              <a:t>Monday </a:t>
-            </a:r>
-            <a:r>
-              <a:rPr lang="en-GB" sz="1600" b="1" dirty="0" smtClean="0">
-                <a:solidFill>
-                  <a:srgbClr val="008000"/>
-                </a:solidFill>
-              </a:rPr>
-              <a:t>December 5 </a:t>
+              <a:t>Monday December 5 </a:t>
             </a:r>
             <a:r>
               <a:rPr lang="en-GB" sz="1600" dirty="0"/>
@@ -10128,37 +10056,8 @@
                   <a:srgbClr val="008000"/>
                 </a:solidFill>
               </a:rPr>
-              <a:t> </a:t>
-            </a:r>
-            <a:r>
-              <a:rPr lang="en-GB" sz="1600" b="1" dirty="0" smtClean="0">
-                <a:solidFill>
-                  <a:srgbClr val="008000"/>
-                </a:solidFill>
-              </a:rPr>
-              <a:t>Sunday </a:t>
-            </a:r>
-            <a:r>
-              <a:rPr lang="en-GB" sz="1600" b="1" dirty="0" smtClean="0">
-                <a:solidFill>
-                  <a:srgbClr val="008000"/>
-                </a:solidFill>
-              </a:rPr>
-              <a:t>January </a:t>
-            </a:r>
-            <a:r>
-              <a:rPr lang="en-GB" sz="1600" b="1" dirty="0" smtClean="0">
-                <a:solidFill>
-                  <a:srgbClr val="008000"/>
-                </a:solidFill>
-              </a:rPr>
-              <a:t>15</a:t>
-            </a:r>
-            <a:endParaRPr lang="en-GB" sz="1600" b="1" dirty="0" smtClean="0">
-              <a:solidFill>
-                <a:srgbClr val="008000"/>
-              </a:solidFill>
-            </a:endParaRPr>
+              <a:t> Sunday January 15</a:t>
+            </a:r>
           </a:p>
           <a:p>
             <a:pPr marL="728663" lvl="1" indent="-271463">
@@ -10218,22 +10117,14 @@
             </a:r>
             <a:r>
               <a:rPr lang="en-GB" sz="1600" dirty="0" smtClean="0"/>
-              <a:t> (if you register in several groups</a:t>
-            </a:r>
-            <a:r>
-              <a:rPr lang="en-GB" sz="1600" dirty="0" smtClean="0"/>
-              <a:t>,</a:t>
+              <a:t> (if you register in several groups,</a:t>
             </a:r>
             <a:br>
               <a:rPr lang="en-GB" sz="1600" dirty="0" smtClean="0"/>
             </a:br>
             <a:r>
               <a:rPr lang="en-GB" sz="1600" dirty="0" smtClean="0"/>
-              <a:t>I </a:t>
-            </a:r>
-            <a:r>
-              <a:rPr lang="en-GB" sz="1600" dirty="0" smtClean="0"/>
-              <a:t>will delete all your registrations)</a:t>
+              <a:t>I will delete all your registrations)</a:t>
             </a:r>
           </a:p>
           <a:p>
@@ -10331,7 +10222,19 @@
             </a:r>
             <a:r>
               <a:rPr lang="en-GB" sz="1600" dirty="0" smtClean="0"/>
-              <a:t> need to have chosen a concrete bachelor project, but you need to have formed a group of 1-3 persons and decided which research group you want to work with</a:t>
+              <a:t> need to have chosen a concrete bachelor project, but you need to have formed a group of 1-3 persons and decided which </a:t>
+            </a:r>
+            <a:r>
+              <a:rPr lang="en-GB" sz="1600" b="1" dirty="0">
+                <a:solidFill>
+                  <a:srgbClr val="008000"/>
+                </a:solidFill>
+              </a:rPr>
+              <a:t>research group</a:t>
+            </a:r>
+            <a:r>
+              <a:rPr lang="en-GB" sz="1600" dirty="0" smtClean="0"/>
+              <a:t> you want to work with</a:t>
             </a:r>
           </a:p>
           <a:p>
@@ -10358,26 +10261,14 @@
             </a:r>
             <a:r>
               <a:rPr lang="en-GB" sz="1600" dirty="0" smtClean="0"/>
-              <a:t>is </a:t>
-            </a:r>
-            <a:r>
-              <a:rPr lang="en-GB" sz="1600" dirty="0" smtClean="0"/>
-              <a:t>12</a:t>
-            </a:r>
-            <a:r>
-              <a:rPr lang="en-GB" sz="1600" dirty="0" smtClean="0"/>
-              <a:t/>
+              <a:t>is 12</a:t>
             </a:r>
             <a:br>
               <a:rPr lang="en-GB" sz="1600" dirty="0" smtClean="0"/>
             </a:br>
             <a:r>
               <a:rPr lang="en-GB" sz="1600" dirty="0" smtClean="0"/>
-              <a:t>(except Bioinformatics where it is </a:t>
-            </a:r>
-            <a:r>
-              <a:rPr lang="en-GB" sz="1600" dirty="0" smtClean="0"/>
-              <a:t>5 and </a:t>
+              <a:t>(except Bioinformatics where it is 5 and </a:t>
             </a:r>
             <a:r>
               <a:rPr lang="en-US" sz="1600" kern="1200" dirty="0">

</xml_diff>